<commit_message>
MAJ 17/04/2018 Signed-off-by: DrBlaf <chauveau.aurelien.76@gmail.com>
</commit_message>
<xml_diff>
--- a/Rapport/Lore/presentation_revu2.pptx
+++ b/Rapport/Lore/presentation_revu2.pptx
@@ -5,7 +5,7 @@
     <p:sldMasterId id="2147483828" r:id="rId1"/>
   </p:sldMasterIdLst>
   <p:notesMasterIdLst>
-    <p:notesMasterId r:id="rId13"/>
+    <p:notesMasterId r:id="rId14"/>
   </p:notesMasterIdLst>
   <p:sldIdLst>
     <p:sldId id="256" r:id="rId2"/>
@@ -19,6 +19,7 @@
     <p:sldId id="274" r:id="rId10"/>
     <p:sldId id="276" r:id="rId11"/>
     <p:sldId id="277" r:id="rId12"/>
+    <p:sldId id="278" r:id="rId13"/>
   </p:sldIdLst>
   <p:sldSz cx="9144000" cy="5715000" type="screen16x10"/>
   <p:notesSz cx="6858000" cy="9144000"/>
@@ -203,7 +204,7 @@
             <a:fld id="{C96F4F48-8193-4084-9575-C48AE4CFB5A7}" type="datetimeFigureOut">
               <a:rPr lang="fr-FR" smtClean="0"/>
               <a:pPr/>
-              <a:t>16/04/2018</a:t>
+              <a:t>17/04/2018</a:t>
             </a:fld>
             <a:endParaRPr lang="fr-FR"/>
           </a:p>
@@ -469,6 +470,88 @@
 </p:notesMaster>
 </file>
 
+<file path=ppt/notesSlides/notesSlide1.xml><?xml version="1.0" encoding="utf-8"?>
+<p:notes xmlns:a="http://schemas.openxmlformats.org/drawingml/2006/main" xmlns:r="http://schemas.openxmlformats.org/officeDocument/2006/relationships" xmlns:p="http://schemas.openxmlformats.org/presentationml/2006/main">
+  <p:cSld>
+    <p:spTree>
+      <p:nvGrpSpPr>
+        <p:cNvPr id="1" name=""/>
+        <p:cNvGrpSpPr/>
+        <p:nvPr/>
+      </p:nvGrpSpPr>
+      <p:grpSpPr>
+        <a:xfrm>
+          <a:off x="0" y="0"/>
+          <a:ext cx="0" cy="0"/>
+          <a:chOff x="0" y="0"/>
+          <a:chExt cx="0" cy="0"/>
+        </a:xfrm>
+      </p:grpSpPr>
+      <p:sp>
+        <p:nvSpPr>
+          <p:cNvPr id="2" name="Espace réservé de l'image des diapositives 1"/>
+          <p:cNvSpPr>
+            <a:spLocks noGrp="1" noRot="1" noChangeAspect="1"/>
+          </p:cNvSpPr>
+          <p:nvPr>
+            <p:ph type="sldImg"/>
+          </p:nvPr>
+        </p:nvSpPr>
+        <p:spPr/>
+      </p:sp>
+      <p:sp>
+        <p:nvSpPr>
+          <p:cNvPr id="3" name="Espace réservé des commentaires 2"/>
+          <p:cNvSpPr>
+            <a:spLocks noGrp="1"/>
+          </p:cNvSpPr>
+          <p:nvPr>
+            <p:ph type="body" idx="1"/>
+          </p:nvPr>
+        </p:nvSpPr>
+        <p:spPr/>
+        <p:txBody>
+          <a:bodyPr>
+            <a:normAutofit/>
+          </a:bodyPr>
+          <a:lstStyle/>
+          <a:p>
+            <a:endParaRPr lang="fr-FR" dirty="0"/>
+          </a:p>
+        </p:txBody>
+      </p:sp>
+      <p:sp>
+        <p:nvSpPr>
+          <p:cNvPr id="4" name="Espace réservé du numéro de diapositive 3"/>
+          <p:cNvSpPr>
+            <a:spLocks noGrp="1"/>
+          </p:cNvSpPr>
+          <p:nvPr>
+            <p:ph type="sldNum" sz="quarter" idx="10"/>
+          </p:nvPr>
+        </p:nvSpPr>
+        <p:spPr/>
+        <p:txBody>
+          <a:bodyPr/>
+          <a:lstStyle/>
+          <a:p>
+            <a:fld id="{DB3D6AC6-0CE7-43FB-A3EF-B6370ACDA050}" type="slidenum">
+              <a:rPr lang="fr-FR" smtClean="0"/>
+              <a:pPr/>
+              <a:t>11</a:t>
+            </a:fld>
+            <a:endParaRPr lang="fr-FR"/>
+          </a:p>
+        </p:txBody>
+      </p:sp>
+    </p:spTree>
+  </p:cSld>
+  <p:clrMapOvr>
+    <a:masterClrMapping/>
+  </p:clrMapOvr>
+</p:notes>
+</file>
+
 <file path=ppt/slideLayouts/slideLayout1.xml><?xml version="1.0" encoding="utf-8"?>
 <p:sldLayout xmlns:a="http://schemas.openxmlformats.org/drawingml/2006/main" xmlns:r="http://schemas.openxmlformats.org/officeDocument/2006/relationships" xmlns:p="http://schemas.openxmlformats.org/presentationml/2006/main" showMasterSp="0" type="title" preserve="1">
   <p:cSld name="Diapositive de titre">
@@ -854,7 +937,7 @@
             <a:fld id="{7385B5F2-299D-41E4-81B4-55AECBC730DC}" type="datetimeFigureOut">
               <a:rPr lang="fr-FR" smtClean="0"/>
               <a:pPr/>
-              <a:t>16/04/2018</a:t>
+              <a:t>17/04/2018</a:t>
             </a:fld>
             <a:endParaRPr lang="fr-FR"/>
           </a:p>
@@ -1021,7 +1104,7 @@
             <a:fld id="{7385B5F2-299D-41E4-81B4-55AECBC730DC}" type="datetimeFigureOut">
               <a:rPr lang="fr-FR" smtClean="0"/>
               <a:pPr/>
-              <a:t>16/04/2018</a:t>
+              <a:t>17/04/2018</a:t>
             </a:fld>
             <a:endParaRPr lang="fr-FR"/>
           </a:p>
@@ -1198,7 +1281,7 @@
             <a:fld id="{7385B5F2-299D-41E4-81B4-55AECBC730DC}" type="datetimeFigureOut">
               <a:rPr lang="fr-FR" smtClean="0"/>
               <a:pPr/>
-              <a:t>16/04/2018</a:t>
+              <a:t>17/04/2018</a:t>
             </a:fld>
             <a:endParaRPr lang="fr-FR"/>
           </a:p>
@@ -1369,7 +1452,7 @@
             <a:fld id="{7385B5F2-299D-41E4-81B4-55AECBC730DC}" type="datetimeFigureOut">
               <a:rPr lang="fr-FR" smtClean="0"/>
               <a:pPr/>
-              <a:t>16/04/2018</a:t>
+              <a:t>17/04/2018</a:t>
             </a:fld>
             <a:endParaRPr lang="fr-FR"/>
           </a:p>
@@ -1833,7 +1916,7 @@
             <a:fld id="{7385B5F2-299D-41E4-81B4-55AECBC730DC}" type="datetimeFigureOut">
               <a:rPr lang="fr-FR" smtClean="0"/>
               <a:pPr/>
-              <a:t>16/04/2018</a:t>
+              <a:t>17/04/2018</a:t>
             </a:fld>
             <a:endParaRPr lang="fr-FR"/>
           </a:p>
@@ -2099,7 +2182,7 @@
             <a:fld id="{7385B5F2-299D-41E4-81B4-55AECBC730DC}" type="datetimeFigureOut">
               <a:rPr lang="fr-FR" smtClean="0"/>
               <a:pPr/>
-              <a:t>16/04/2018</a:t>
+              <a:t>17/04/2018</a:t>
             </a:fld>
             <a:endParaRPr lang="fr-FR"/>
           </a:p>
@@ -2475,7 +2558,7 @@
             <a:fld id="{7385B5F2-299D-41E4-81B4-55AECBC730DC}" type="datetimeFigureOut">
               <a:rPr lang="fr-FR" smtClean="0"/>
               <a:pPr/>
-              <a:t>16/04/2018</a:t>
+              <a:t>17/04/2018</a:t>
             </a:fld>
             <a:endParaRPr lang="fr-FR"/>
           </a:p>
@@ -2599,7 +2682,7 @@
             <a:fld id="{7385B5F2-299D-41E4-81B4-55AECBC730DC}" type="datetimeFigureOut">
               <a:rPr lang="fr-FR" smtClean="0"/>
               <a:pPr/>
-              <a:t>16/04/2018</a:t>
+              <a:t>17/04/2018</a:t>
             </a:fld>
             <a:endParaRPr lang="fr-FR"/>
           </a:p>
@@ -2691,7 +2774,7 @@
             <a:fld id="{7385B5F2-299D-41E4-81B4-55AECBC730DC}" type="datetimeFigureOut">
               <a:rPr lang="fr-FR" smtClean="0"/>
               <a:pPr/>
-              <a:t>16/04/2018</a:t>
+              <a:t>17/04/2018</a:t>
             </a:fld>
             <a:endParaRPr lang="fr-FR"/>
           </a:p>
@@ -2942,7 +3025,7 @@
             <a:fld id="{7385B5F2-299D-41E4-81B4-55AECBC730DC}" type="datetimeFigureOut">
               <a:rPr lang="fr-FR" smtClean="0"/>
               <a:pPr/>
-              <a:t>16/04/2018</a:t>
+              <a:t>17/04/2018</a:t>
             </a:fld>
             <a:endParaRPr lang="fr-FR"/>
           </a:p>
@@ -3203,7 +3286,7 @@
             <a:fld id="{7385B5F2-299D-41E4-81B4-55AECBC730DC}" type="datetimeFigureOut">
               <a:rPr lang="fr-FR" smtClean="0"/>
               <a:pPr/>
-              <a:t>16/04/2018</a:t>
+              <a:t>17/04/2018</a:t>
             </a:fld>
             <a:endParaRPr lang="fr-FR"/>
           </a:p>
@@ -3609,7 +3692,7 @@
             <a:fld id="{7385B5F2-299D-41E4-81B4-55AECBC730DC}" type="datetimeFigureOut">
               <a:rPr lang="fr-FR" smtClean="0"/>
               <a:pPr/>
-              <a:t>16/04/2018</a:t>
+              <a:t>17/04/2018</a:t>
             </a:fld>
             <a:endParaRPr lang="fr-FR"/>
           </a:p>
@@ -4050,7 +4133,11 @@
           <a:p>
             <a:r>
               <a:rPr lang="fr-FR" dirty="0" smtClean="0"/>
-              <a:t>Revu de projet N°2</a:t>
+              <a:t>Revu de projet </a:t>
+            </a:r>
+            <a:r>
+              <a:rPr lang="fr-FR" dirty="0" smtClean="0"/>
+              <a:t>N°3</a:t>
             </a:r>
             <a:endParaRPr lang="fr-FR" dirty="0"/>
           </a:p>
@@ -4129,28 +4216,7 @@
                   </a:outerShdw>
                 </a:effectLst>
               </a:rPr>
-              <a:t>REGROUPEMENT DES </a:t>
-            </a:r>
-            <a:r>
-              <a:rPr lang="fr-FR" dirty="0" smtClean="0">
-                <a:ln w="18415" cmpd="sng">
-                  <a:solidFill>
-                    <a:srgbClr val="FFFFFF"/>
-                  </a:solidFill>
-                  <a:prstDash val="solid"/>
-                </a:ln>
-                <a:solidFill>
-                  <a:srgbClr val="FFFFFF"/>
-                </a:solidFill>
-                <a:effectLst>
-                  <a:outerShdw blurRad="63500" dir="3600000" algn="tl" rotWithShape="0">
-                    <a:srgbClr val="000000">
-                      <a:alpha val="70000"/>
-                    </a:srgbClr>
-                  </a:outerShdw>
-                </a:effectLst>
-              </a:rPr>
-              <a:t>COMPOSANTS : </a:t>
+              <a:t>REGROUPEMENT DES COMPOSANTS : </a:t>
             </a:r>
             <a:endParaRPr lang="fr-FR" dirty="0">
               <a:ln w="18415" cmpd="sng">
@@ -4220,61 +4286,7 @@
                   </a:innerShdw>
                 </a:effectLst>
               </a:rPr>
-              <a:t>LA </a:t>
-            </a:r>
-            <a:r>
-              <a:rPr lang="fr-FR" b="1" spc="50" dirty="0" smtClean="0">
-                <a:ln w="13500">
-                  <a:solidFill>
-                    <a:schemeClr val="accent1">
-                      <a:shade val="2500"/>
-                      <a:alpha val="6500"/>
-                    </a:schemeClr>
-                  </a:solidFill>
-                  <a:prstDash val="solid"/>
-                </a:ln>
-                <a:solidFill>
-                  <a:schemeClr val="accent1">
-                    <a:tint val="3000"/>
-                    <a:alpha val="95000"/>
-                  </a:schemeClr>
-                </a:solidFill>
-                <a:effectLst>
-                  <a:innerShdw blurRad="50900" dist="38500" dir="13500000">
-                    <a:srgbClr val="000000">
-                      <a:alpha val="60000"/>
-                    </a:srgbClr>
-                  </a:innerShdw>
-                </a:effectLst>
-              </a:rPr>
-              <a:t>CARTE SSD, LE MODUL RTC ET LE COMPTEUR </a:t>
-            </a:r>
-            <a:r>
-              <a:rPr lang="fr-FR" b="1" spc="50" dirty="0" smtClean="0">
-                <a:ln w="13500">
-                  <a:solidFill>
-                    <a:schemeClr val="accent1">
-                      <a:shade val="2500"/>
-                      <a:alpha val="6500"/>
-                    </a:schemeClr>
-                  </a:solidFill>
-                  <a:prstDash val="solid"/>
-                </a:ln>
-                <a:solidFill>
-                  <a:schemeClr val="accent1">
-                    <a:tint val="3000"/>
-                    <a:alpha val="95000"/>
-                  </a:schemeClr>
-                </a:solidFill>
-                <a:effectLst>
-                  <a:innerShdw blurRad="50900" dist="38500" dir="13500000">
-                    <a:srgbClr val="000000">
-                      <a:alpha val="60000"/>
-                    </a:srgbClr>
-                  </a:innerShdw>
-                </a:effectLst>
-              </a:rPr>
-              <a:t>ÉLECTRIQUE </a:t>
+              <a:t>LA CARTE SSD, LE MODUL RTC ET LE COMPTEUR ÉLECTRIQUE </a:t>
             </a:r>
             <a:endParaRPr lang="fr-FR" b="1" dirty="0" smtClean="0"/>
           </a:p>
@@ -4505,7 +4517,7 @@
           <p:nvPr/>
         </p:nvPicPr>
         <p:blipFill>
-          <a:blip r:embed="rId2"/>
+          <a:blip r:embed="rId3"/>
           <a:srcRect/>
           <a:stretch>
             <a:fillRect/>
@@ -4576,28 +4588,7 @@
                   </a:outerShdw>
                 </a:effectLst>
               </a:rPr>
-              <a:t>REGROUPEMENT DES </a:t>
-            </a:r>
-            <a:r>
-              <a:rPr lang="fr-FR" dirty="0" smtClean="0">
-                <a:ln w="18415" cmpd="sng">
-                  <a:solidFill>
-                    <a:srgbClr val="FFFFFF"/>
-                  </a:solidFill>
-                  <a:prstDash val="solid"/>
-                </a:ln>
-                <a:solidFill>
-                  <a:srgbClr val="FFFFFF"/>
-                </a:solidFill>
-                <a:effectLst>
-                  <a:outerShdw blurRad="63500" dir="3600000" algn="tl" rotWithShape="0">
-                    <a:srgbClr val="000000">
-                      <a:alpha val="70000"/>
-                    </a:srgbClr>
-                  </a:outerShdw>
-                </a:effectLst>
-              </a:rPr>
-              <a:t>COMPOSANTS : </a:t>
+              <a:t>REGROUPEMENT DES COMPOSANTS : </a:t>
             </a:r>
             <a:endParaRPr lang="fr-FR" dirty="0">
               <a:ln w="18415" cmpd="sng">
@@ -4667,8 +4658,210 @@
                   </a:innerShdw>
                 </a:effectLst>
               </a:rPr>
-              <a:t>LE TERMOMÉTRE, l'HYGROMÉTRE, LE CAPTEUR DE </a:t>
-            </a:r>
+              <a:t>LE TERMOMÉTRE, l'HYGROMÉTRE, LE CAPTEUR DE QUALITE D'AIR ET LE RELAIS</a:t>
+            </a:r>
+          </a:p>
+          <a:p>
+            <a:endParaRPr lang="fr-FR" dirty="0"/>
+          </a:p>
+        </p:txBody>
+      </p:sp>
+      <p:pic>
+        <p:nvPicPr>
+          <p:cNvPr id="7" name="Image 6" descr="montage_AQ_R_T_H.png"/>
+          <p:cNvPicPr/>
+          <p:nvPr/>
+        </p:nvPicPr>
+        <p:blipFill>
+          <a:blip r:embed="rId4"/>
+          <a:stretch>
+            <a:fillRect/>
+          </a:stretch>
+        </p:blipFill>
+        <p:spPr>
+          <a:xfrm>
+            <a:off x="3357554" y="1785930"/>
+            <a:ext cx="4786346" cy="3583207"/>
+          </a:xfrm>
+          <a:prstGeom prst="rect">
+            <a:avLst/>
+          </a:prstGeom>
+          <a:ln w="38100" cap="sq">
+            <a:solidFill>
+              <a:schemeClr val="accent1"/>
+            </a:solidFill>
+            <a:prstDash val="solid"/>
+            <a:miter lim="800000"/>
+          </a:ln>
+          <a:effectLst>
+            <a:outerShdw blurRad="50800" dist="38100" dir="2700000" algn="tl" rotWithShape="0">
+              <a:srgbClr val="000000">
+                <a:alpha val="43000"/>
+              </a:srgbClr>
+            </a:outerShdw>
+          </a:effectLst>
+        </p:spPr>
+      </p:pic>
+      <p:sp>
+        <p:nvSpPr>
+          <p:cNvPr id="9" name="ZoneTexte 8"/>
+          <p:cNvSpPr txBox="1"/>
+          <p:nvPr/>
+        </p:nvSpPr>
+        <p:spPr>
+          <a:xfrm>
+            <a:off x="4214810" y="1428740"/>
+            <a:ext cx="3429024" cy="369332"/>
+          </a:xfrm>
+          <a:prstGeom prst="rect">
+            <a:avLst/>
+          </a:prstGeom>
+          <a:noFill/>
+        </p:spPr>
+        <p:txBody>
+          <a:bodyPr wrap="square" rtlCol="0">
+            <a:spAutoFit/>
+          </a:bodyPr>
+          <a:lstStyle/>
+          <a:p>
+            <a:r>
+              <a:rPr lang="fr-FR" b="1" dirty="0" smtClean="0">
+                <a:solidFill>
+                  <a:schemeClr val="accent3"/>
+                </a:solidFill>
+                <a:latin typeface="Courier New" pitchFamily="49" charset="0"/>
+                <a:cs typeface="Courier New" pitchFamily="49" charset="0"/>
+              </a:rPr>
+              <a:t>Montage du regroupement</a:t>
+            </a:r>
+            <a:endParaRPr lang="fr-FR" b="1" dirty="0">
+              <a:solidFill>
+                <a:schemeClr val="accent3"/>
+              </a:solidFill>
+              <a:latin typeface="Courier New" pitchFamily="49" charset="0"/>
+              <a:cs typeface="Courier New" pitchFamily="49" charset="0"/>
+            </a:endParaRPr>
+          </a:p>
+        </p:txBody>
+      </p:sp>
+    </p:spTree>
+  </p:cSld>
+  <p:clrMapOvr>
+    <a:masterClrMapping/>
+  </p:clrMapOvr>
+  <p:timing>
+    <p:tnLst>
+      <p:par>
+        <p:cTn id="1" dur="indefinite" restart="never" nodeType="tmRoot"/>
+      </p:par>
+    </p:tnLst>
+  </p:timing>
+</p:sld>
+</file>
+
+<file path=ppt/slides/slide12.xml><?xml version="1.0" encoding="utf-8"?>
+<p:sld xmlns:a="http://schemas.openxmlformats.org/drawingml/2006/main" xmlns:r="http://schemas.openxmlformats.org/officeDocument/2006/relationships" xmlns:p="http://schemas.openxmlformats.org/presentationml/2006/main">
+  <p:cSld>
+    <p:spTree>
+      <p:nvGrpSpPr>
+        <p:cNvPr id="1" name=""/>
+        <p:cNvGrpSpPr/>
+        <p:nvPr/>
+      </p:nvGrpSpPr>
+      <p:grpSpPr>
+        <a:xfrm>
+          <a:off x="0" y="0"/>
+          <a:ext cx="0" cy="0"/>
+          <a:chOff x="0" y="0"/>
+          <a:chExt cx="0" cy="0"/>
+        </a:xfrm>
+      </p:grpSpPr>
+      <p:sp>
+        <p:nvSpPr>
+          <p:cNvPr id="2" name="Titre 1"/>
+          <p:cNvSpPr>
+            <a:spLocks noGrp="1"/>
+          </p:cNvSpPr>
+          <p:nvPr>
+            <p:ph type="title"/>
+          </p:nvPr>
+        </p:nvSpPr>
+        <p:spPr>
+          <a:xfrm>
+            <a:off x="142844" y="142856"/>
+            <a:ext cx="8686800" cy="952500"/>
+          </a:xfrm>
+        </p:spPr>
+        <p:txBody>
+          <a:bodyPr>
+            <a:normAutofit fontScale="90000"/>
+          </a:bodyPr>
+          <a:lstStyle/>
+          <a:p>
+            <a:r>
+              <a:rPr lang="fr-FR" dirty="0" smtClean="0">
+                <a:ln w="18415" cmpd="sng">
+                  <a:solidFill>
+                    <a:srgbClr val="FFFFFF"/>
+                  </a:solidFill>
+                  <a:prstDash val="solid"/>
+                </a:ln>
+                <a:solidFill>
+                  <a:srgbClr val="FFFFFF"/>
+                </a:solidFill>
+                <a:effectLst>
+                  <a:outerShdw blurRad="63500" dir="3600000" algn="tl" rotWithShape="0">
+                    <a:srgbClr val="000000">
+                      <a:alpha val="70000"/>
+                    </a:srgbClr>
+                  </a:outerShdw>
+                </a:effectLst>
+              </a:rPr>
+              <a:t>REGROUPEMENT DES COMPOSANTS : </a:t>
+            </a:r>
+            <a:endParaRPr lang="fr-FR" dirty="0">
+              <a:ln w="18415" cmpd="sng">
+                <a:solidFill>
+                  <a:srgbClr val="FFFFFF"/>
+                </a:solidFill>
+                <a:prstDash val="solid"/>
+              </a:ln>
+              <a:solidFill>
+                <a:srgbClr val="FFFFFF"/>
+              </a:solidFill>
+              <a:effectLst>
+                <a:outerShdw blurRad="63500" dir="3600000" algn="tl" rotWithShape="0">
+                  <a:srgbClr val="000000">
+                    <a:alpha val="70000"/>
+                  </a:srgbClr>
+                </a:outerShdw>
+              </a:effectLst>
+            </a:endParaRPr>
+          </a:p>
+        </p:txBody>
+      </p:sp>
+      <p:sp>
+        <p:nvSpPr>
+          <p:cNvPr id="4" name="ZoneTexte 3"/>
+          <p:cNvSpPr txBox="1"/>
+          <p:nvPr/>
+        </p:nvSpPr>
+        <p:spPr>
+          <a:xfrm>
+            <a:off x="500035" y="1000112"/>
+            <a:ext cx="7786742" cy="646331"/>
+          </a:xfrm>
+          <a:prstGeom prst="rect">
+            <a:avLst/>
+          </a:prstGeom>
+          <a:noFill/>
+        </p:spPr>
+        <p:txBody>
+          <a:bodyPr wrap="square" rtlCol="0">
+            <a:spAutoFit/>
+          </a:bodyPr>
+          <a:lstStyle/>
+          <a:p>
             <a:r>
               <a:rPr lang="fr-FR" b="1" spc="50" dirty="0" smtClean="0">
                 <a:ln w="13500">
@@ -4694,61 +4887,7 @@
                   </a:innerShdw>
                 </a:effectLst>
               </a:rPr>
-              <a:t>QUALITE </a:t>
-            </a:r>
-            <a:r>
-              <a:rPr lang="fr-FR" b="1" spc="50" dirty="0" smtClean="0">
-                <a:ln w="13500">
-                  <a:solidFill>
-                    <a:schemeClr val="accent1">
-                      <a:shade val="2500"/>
-                      <a:alpha val="6500"/>
-                    </a:schemeClr>
-                  </a:solidFill>
-                  <a:prstDash val="solid"/>
-                </a:ln>
-                <a:solidFill>
-                  <a:schemeClr val="accent1">
-                    <a:tint val="3000"/>
-                    <a:alpha val="95000"/>
-                  </a:schemeClr>
-                </a:solidFill>
-                <a:effectLst>
-                  <a:innerShdw blurRad="50900" dist="38500" dir="13500000">
-                    <a:srgbClr val="000000">
-                      <a:alpha val="60000"/>
-                    </a:srgbClr>
-                  </a:innerShdw>
-                </a:effectLst>
-              </a:rPr>
-              <a:t>D'AIR ET LE </a:t>
-            </a:r>
-            <a:r>
-              <a:rPr lang="fr-FR" b="1" spc="50" dirty="0" smtClean="0">
-                <a:ln w="13500">
-                  <a:solidFill>
-                    <a:schemeClr val="accent1">
-                      <a:shade val="2500"/>
-                      <a:alpha val="6500"/>
-                    </a:schemeClr>
-                  </a:solidFill>
-                  <a:prstDash val="solid"/>
-                </a:ln>
-                <a:solidFill>
-                  <a:schemeClr val="accent1">
-                    <a:tint val="3000"/>
-                    <a:alpha val="95000"/>
-                  </a:schemeClr>
-                </a:solidFill>
-                <a:effectLst>
-                  <a:innerShdw blurRad="50900" dist="38500" dir="13500000">
-                    <a:srgbClr val="000000">
-                      <a:alpha val="60000"/>
-                    </a:srgbClr>
-                  </a:innerShdw>
-                </a:effectLst>
-              </a:rPr>
-              <a:t>RELAIS</a:t>
+              <a:t>REGROUPEMENT FINAL DE CETTE PARTIE</a:t>
             </a:r>
             <a:endParaRPr lang="fr-FR" b="1" spc="50" dirty="0" smtClean="0">
               <a:ln w="13500">
@@ -4782,20 +4921,22 @@
       </p:sp>
       <p:pic>
         <p:nvPicPr>
-          <p:cNvPr id="7" name="Image 6" descr="montage_AQ_R_T_H.png"/>
-          <p:cNvPicPr/>
+          <p:cNvPr id="10" name="Image 9" descr="regroupement.PNG"/>
+          <p:cNvPicPr>
+            <a:picLocks noChangeAspect="1"/>
+          </p:cNvPicPr>
           <p:nvPr/>
         </p:nvPicPr>
         <p:blipFill>
-          <a:blip r:embed="rId3"/>
+          <a:blip r:embed="rId2"/>
           <a:stretch>
             <a:fillRect/>
           </a:stretch>
         </p:blipFill>
         <p:spPr>
           <a:xfrm>
-            <a:off x="3357554" y="1785930"/>
-            <a:ext cx="4786346" cy="3583207"/>
+            <a:off x="71406" y="1428740"/>
+            <a:ext cx="4681188" cy="4205135"/>
           </a:xfrm>
           <a:prstGeom prst="rect">
             <a:avLst/>
@@ -4816,6 +4957,44 @@
           </a:effectLst>
         </p:spPr>
       </p:pic>
+      <p:pic>
+        <p:nvPicPr>
+          <p:cNvPr id="11" name="Image 10" descr="timer.PNG"/>
+          <p:cNvPicPr>
+            <a:picLocks noChangeAspect="1"/>
+          </p:cNvPicPr>
+          <p:nvPr/>
+        </p:nvPicPr>
+        <p:blipFill>
+          <a:blip r:embed="rId3"/>
+          <a:stretch>
+            <a:fillRect/>
+          </a:stretch>
+        </p:blipFill>
+        <p:spPr>
+          <a:xfrm>
+            <a:off x="5357818" y="2000244"/>
+            <a:ext cx="2648320" cy="666843"/>
+          </a:xfrm>
+          <a:prstGeom prst="rect">
+            <a:avLst/>
+          </a:prstGeom>
+          <a:ln w="38100" cap="sq">
+            <a:solidFill>
+              <a:schemeClr val="accent1"/>
+            </a:solidFill>
+            <a:prstDash val="solid"/>
+            <a:miter lim="800000"/>
+          </a:ln>
+          <a:effectLst>
+            <a:outerShdw blurRad="50800" dist="38100" dir="2700000" algn="tl" rotWithShape="0">
+              <a:srgbClr val="000000">
+                <a:alpha val="43000"/>
+              </a:srgbClr>
+            </a:outerShdw>
+          </a:effectLst>
+        </p:spPr>
+      </p:pic>
       <p:sp>
         <p:nvSpPr>
           <p:cNvPr id="9" name="ZoneTexte 8"/>
@@ -4824,8 +5003,8 @@
         </p:nvSpPr>
         <p:spPr>
           <a:xfrm>
-            <a:off x="4214810" y="1428740"/>
-            <a:ext cx="3429024" cy="369332"/>
+            <a:off x="71406" y="1428740"/>
+            <a:ext cx="1357322" cy="646331"/>
           </a:xfrm>
           <a:prstGeom prst="rect">
             <a:avLst/>
@@ -4839,16 +5018,116 @@
           <a:lstStyle/>
           <a:p>
             <a:r>
-              <a:rPr lang="fr-FR" b="1" dirty="0" smtClean="0">
+              <a:rPr lang="fr-FR" sz="1200" b="1" dirty="0" smtClean="0">
                 <a:solidFill>
                   <a:schemeClr val="accent3"/>
                 </a:solidFill>
                 <a:latin typeface="Courier New" pitchFamily="49" charset="0"/>
                 <a:cs typeface="Courier New" pitchFamily="49" charset="0"/>
               </a:rPr>
-              <a:t>Montage du regroupement</a:t>
-            </a:r>
-            <a:endParaRPr lang="fr-FR" b="1" dirty="0">
+              <a:t>Montage du </a:t>
+            </a:r>
+            <a:r>
+              <a:rPr lang="fr-FR" sz="1200" b="1" dirty="0" smtClean="0">
+                <a:solidFill>
+                  <a:schemeClr val="accent3"/>
+                </a:solidFill>
+                <a:latin typeface="Courier New" pitchFamily="49" charset="0"/>
+                <a:cs typeface="Courier New" pitchFamily="49" charset="0"/>
+              </a:rPr>
+              <a:t>regroupement final</a:t>
+            </a:r>
+            <a:endParaRPr lang="fr-FR" sz="1200" b="1" dirty="0">
+              <a:solidFill>
+                <a:schemeClr val="accent3"/>
+              </a:solidFill>
+              <a:latin typeface="Courier New" pitchFamily="49" charset="0"/>
+              <a:cs typeface="Courier New" pitchFamily="49" charset="0"/>
+            </a:endParaRPr>
+          </a:p>
+        </p:txBody>
+      </p:sp>
+      <p:pic>
+        <p:nvPicPr>
+          <p:cNvPr id="12" name="Image 11" descr="timer_2.PNG"/>
+          <p:cNvPicPr>
+            <a:picLocks noChangeAspect="1"/>
+          </p:cNvPicPr>
+          <p:nvPr/>
+        </p:nvPicPr>
+        <p:blipFill>
+          <a:blip r:embed="rId4"/>
+          <a:stretch>
+            <a:fillRect/>
+          </a:stretch>
+        </p:blipFill>
+        <p:spPr>
+          <a:xfrm>
+            <a:off x="5715008" y="2857500"/>
+            <a:ext cx="1952898" cy="1514687"/>
+          </a:xfrm>
+          <a:prstGeom prst="rect">
+            <a:avLst/>
+          </a:prstGeom>
+          <a:ln w="38100" cap="sq">
+            <a:solidFill>
+              <a:schemeClr val="accent1"/>
+            </a:solidFill>
+            <a:prstDash val="solid"/>
+            <a:miter lim="800000"/>
+          </a:ln>
+          <a:effectLst>
+            <a:outerShdw blurRad="50800" dist="38100" dir="2700000" algn="tl" rotWithShape="0">
+              <a:srgbClr val="000000">
+                <a:alpha val="43000"/>
+              </a:srgbClr>
+            </a:outerShdw>
+          </a:effectLst>
+        </p:spPr>
+      </p:pic>
+      <p:sp>
+        <p:nvSpPr>
+          <p:cNvPr id="13" name="ZoneTexte 12"/>
+          <p:cNvSpPr txBox="1"/>
+          <p:nvPr/>
+        </p:nvSpPr>
+        <p:spPr>
+          <a:xfrm>
+            <a:off x="6215074" y="1643054"/>
+            <a:ext cx="1071570" cy="276999"/>
+          </a:xfrm>
+          <a:prstGeom prst="rect">
+            <a:avLst/>
+          </a:prstGeom>
+          <a:noFill/>
+        </p:spPr>
+        <p:txBody>
+          <a:bodyPr wrap="square" rtlCol="0">
+            <a:spAutoFit/>
+          </a:bodyPr>
+          <a:lstStyle/>
+          <a:p>
+            <a:r>
+              <a:rPr lang="fr-FR" sz="1200" b="1" dirty="0" smtClean="0">
+                <a:solidFill>
+                  <a:schemeClr val="accent3"/>
+                </a:solidFill>
+                <a:latin typeface="Courier New" pitchFamily="49" charset="0"/>
+                <a:cs typeface="Courier New" pitchFamily="49" charset="0"/>
+              </a:rPr>
+              <a:t>Le t</a:t>
+            </a:r>
+            <a:r>
+              <a:rPr lang="fr-FR" sz="1200" b="1" dirty="0" smtClean="0">
+                <a:solidFill>
+                  <a:schemeClr val="accent3"/>
+                </a:solidFill>
+                <a:latin typeface="Courier New" pitchFamily="49" charset="0"/>
+                <a:cs typeface="Courier New" pitchFamily="49" charset="0"/>
+              </a:rPr>
+              <a:t>imer</a:t>
+            </a:r>
+            <a:endParaRPr lang="fr-FR" sz="1200" b="1" dirty="0">
               <a:solidFill>
                 <a:schemeClr val="accent3"/>
               </a:solidFill>
@@ -5031,7 +5310,7 @@
           <a:prstGeom prst="rect">
             <a:avLst/>
           </a:prstGeom>
-          <a:ln w="19050" cap="sq">
+          <a:ln w="38100" cap="sq">
             <a:solidFill>
               <a:schemeClr val="accent1"/>
             </a:solidFill>
@@ -5515,7 +5794,7 @@
         </p:nvSpPr>
         <p:spPr>
           <a:xfrm>
-            <a:off x="4071934" y="1142988"/>
+            <a:off x="4286248" y="1142988"/>
             <a:ext cx="71438" cy="4357718"/>
           </a:xfrm>
           <a:prstGeom prst="rect">
@@ -6824,6 +7103,120 @@
       </p:pic>
       <p:sp>
         <p:nvSpPr>
+          <p:cNvPr id="15" name="Ellipse 14"/>
+          <p:cNvSpPr/>
+          <p:nvPr/>
+        </p:nvSpPr>
+        <p:spPr>
+          <a:xfrm>
+            <a:off x="4143372" y="3429004"/>
+            <a:ext cx="357190" cy="357190"/>
+          </a:xfrm>
+          <a:prstGeom prst="ellipse">
+            <a:avLst/>
+          </a:prstGeom>
+        </p:spPr>
+        <p:style>
+          <a:lnRef idx="2">
+            <a:schemeClr val="accent1">
+              <a:shade val="50000"/>
+            </a:schemeClr>
+          </a:lnRef>
+          <a:fillRef idx="1">
+            <a:schemeClr val="accent1"/>
+          </a:fillRef>
+          <a:effectRef idx="0">
+            <a:schemeClr val="accent1"/>
+          </a:effectRef>
+          <a:fontRef idx="minor">
+            <a:schemeClr val="lt1"/>
+          </a:fontRef>
+        </p:style>
+        <p:txBody>
+          <a:bodyPr rtlCol="0" anchor="ctr"/>
+          <a:lstStyle/>
+          <a:p>
+            <a:pPr algn="ctr"/>
+            <a:endParaRPr lang="fr-FR" dirty="0"/>
+          </a:p>
+        </p:txBody>
+      </p:sp>
+      <p:sp>
+        <p:nvSpPr>
+          <p:cNvPr id="9" name="ZoneTexte 8"/>
+          <p:cNvSpPr txBox="1"/>
+          <p:nvPr/>
+        </p:nvSpPr>
+        <p:spPr>
+          <a:xfrm>
+            <a:off x="1652477" y="2428872"/>
+            <a:ext cx="633507" cy="230832"/>
+          </a:xfrm>
+          <a:prstGeom prst="rect">
+            <a:avLst/>
+          </a:prstGeom>
+          <a:noFill/>
+        </p:spPr>
+        <p:txBody>
+          <a:bodyPr wrap="none" rtlCol="0">
+            <a:spAutoFit/>
+          </a:bodyPr>
+          <a:lstStyle/>
+          <a:p>
+            <a:r>
+              <a:rPr lang="fr-FR" sz="900" dirty="0" smtClean="0">
+                <a:solidFill>
+                  <a:srgbClr val="FF0000"/>
+                </a:solidFill>
+              </a:rPr>
+              <a:t>Montage</a:t>
+            </a:r>
+            <a:endParaRPr lang="fr-FR" dirty="0">
+              <a:solidFill>
+                <a:srgbClr val="FF0000"/>
+              </a:solidFill>
+            </a:endParaRPr>
+          </a:p>
+        </p:txBody>
+      </p:sp>
+      <p:pic>
+        <p:nvPicPr>
+          <p:cNvPr id="12" name="Image 11" descr="Sema_radiateur_on.png"/>
+          <p:cNvPicPr/>
+          <p:nvPr/>
+        </p:nvPicPr>
+        <p:blipFill>
+          <a:blip r:embed="rId3"/>
+          <a:stretch>
+            <a:fillRect/>
+          </a:stretch>
+        </p:blipFill>
+        <p:spPr>
+          <a:xfrm>
+            <a:off x="357158" y="1785930"/>
+            <a:ext cx="5259225" cy="3632529"/>
+          </a:xfrm>
+          <a:prstGeom prst="rect">
+            <a:avLst/>
+          </a:prstGeom>
+          <a:ln w="38100" cap="sq">
+            <a:solidFill>
+              <a:schemeClr val="accent1"/>
+            </a:solidFill>
+            <a:prstDash val="solid"/>
+            <a:miter lim="800000"/>
+          </a:ln>
+          <a:effectLst>
+            <a:outerShdw blurRad="50800" dist="38100" dir="2700000" algn="tl" rotWithShape="0">
+              <a:srgbClr val="000000">
+                <a:alpha val="43000"/>
+              </a:srgbClr>
+            </a:outerShdw>
+          </a:effectLst>
+        </p:spPr>
+      </p:pic>
+      <p:sp>
+        <p:nvSpPr>
           <p:cNvPr id="4" name="Titre 1"/>
           <p:cNvSpPr txBox="1">
             <a:spLocks/>
@@ -6992,20 +7385,20 @@
       </p:sp>
       <p:pic>
         <p:nvPicPr>
-          <p:cNvPr id="12" name="Image 11" descr="Sema_radiateur_on.png"/>
+          <p:cNvPr id="10" name="Image 9" descr="arduino_relai.jpg"/>
           <p:cNvPicPr/>
           <p:nvPr/>
         </p:nvPicPr>
         <p:blipFill>
-          <a:blip r:embed="rId3"/>
+          <a:blip r:embed="rId4"/>
           <a:stretch>
             <a:fillRect/>
           </a:stretch>
         </p:blipFill>
         <p:spPr>
           <a:xfrm>
-            <a:off x="357158" y="1785930"/>
-            <a:ext cx="5259225" cy="3632529"/>
+            <a:off x="4357686" y="1214426"/>
+            <a:ext cx="4461822" cy="1951681"/>
           </a:xfrm>
           <a:prstGeom prst="rect">
             <a:avLst/>
@@ -7028,20 +7421,21 @@
       </p:pic>
       <p:pic>
         <p:nvPicPr>
-          <p:cNvPr id="10" name="Image 9" descr="arduino_relai.jpg"/>
+          <p:cNvPr id="13" name="Image 12"/>
           <p:cNvPicPr/>
           <p:nvPr/>
         </p:nvPicPr>
         <p:blipFill>
-          <a:blip r:embed="rId4"/>
+          <a:blip r:embed="rId5"/>
+          <a:srcRect/>
           <a:stretch>
             <a:fillRect/>
           </a:stretch>
         </p:blipFill>
-        <p:spPr>
-          <a:xfrm>
-            <a:off x="4357686" y="1214426"/>
-            <a:ext cx="4461822" cy="1951681"/>
+        <p:spPr bwMode="auto">
+          <a:xfrm>
+            <a:off x="6143636" y="3357566"/>
+            <a:ext cx="2437691" cy="2132108"/>
           </a:xfrm>
           <a:prstGeom prst="rect">
             <a:avLst/>
@@ -7062,81 +7456,6 @@
           </a:effectLst>
         </p:spPr>
       </p:pic>
-      <p:pic>
-        <p:nvPicPr>
-          <p:cNvPr id="13" name="Image 12"/>
-          <p:cNvPicPr/>
-          <p:nvPr/>
-        </p:nvPicPr>
-        <p:blipFill>
-          <a:blip r:embed="rId5"/>
-          <a:srcRect/>
-          <a:stretch>
-            <a:fillRect/>
-          </a:stretch>
-        </p:blipFill>
-        <p:spPr bwMode="auto">
-          <a:xfrm>
-            <a:off x="6143636" y="3357566"/>
-            <a:ext cx="2437691" cy="2132108"/>
-          </a:xfrm>
-          <a:prstGeom prst="rect">
-            <a:avLst/>
-          </a:prstGeom>
-          <a:ln w="38100" cap="sq">
-            <a:solidFill>
-              <a:schemeClr val="accent1"/>
-            </a:solidFill>
-            <a:prstDash val="solid"/>
-            <a:miter lim="800000"/>
-          </a:ln>
-          <a:effectLst>
-            <a:outerShdw blurRad="50800" dist="38100" dir="2700000" algn="tl" rotWithShape="0">
-              <a:srgbClr val="000000">
-                <a:alpha val="43000"/>
-              </a:srgbClr>
-            </a:outerShdw>
-          </a:effectLst>
-        </p:spPr>
-      </p:pic>
-      <p:sp>
-        <p:nvSpPr>
-          <p:cNvPr id="9" name="ZoneTexte 8"/>
-          <p:cNvSpPr txBox="1"/>
-          <p:nvPr/>
-        </p:nvSpPr>
-        <p:spPr>
-          <a:xfrm>
-            <a:off x="1652477" y="2428872"/>
-            <a:ext cx="633507" cy="230832"/>
-          </a:xfrm>
-          <a:prstGeom prst="rect">
-            <a:avLst/>
-          </a:prstGeom>
-          <a:noFill/>
-        </p:spPr>
-        <p:txBody>
-          <a:bodyPr wrap="none" rtlCol="0">
-            <a:spAutoFit/>
-          </a:bodyPr>
-          <a:lstStyle/>
-          <a:p>
-            <a:r>
-              <a:rPr lang="fr-FR" sz="900" dirty="0" smtClean="0">
-                <a:solidFill>
-                  <a:srgbClr val="FF0000"/>
-                </a:solidFill>
-              </a:rPr>
-              <a:t>Montage</a:t>
-            </a:r>
-            <a:endParaRPr lang="fr-FR" dirty="0">
-              <a:solidFill>
-                <a:srgbClr val="FF0000"/>
-              </a:solidFill>
-            </a:endParaRPr>
-          </a:p>
-        </p:txBody>
-      </p:sp>
       <p:sp>
         <p:nvSpPr>
           <p:cNvPr id="7" name="ZoneTexte 6"/>
@@ -7176,6 +7495,50 @@
               <a:latin typeface="Courier New" pitchFamily="49" charset="0"/>
               <a:cs typeface="Courier New" pitchFamily="49" charset="0"/>
             </a:endParaRPr>
+          </a:p>
+        </p:txBody>
+      </p:sp>
+      <p:sp>
+        <p:nvSpPr>
+          <p:cNvPr id="14" name="Ellipse 13"/>
+          <p:cNvSpPr/>
+          <p:nvPr/>
+        </p:nvSpPr>
+        <p:spPr>
+          <a:xfrm>
+            <a:off x="4286248" y="3500442"/>
+            <a:ext cx="571504" cy="571504"/>
+          </a:xfrm>
+          <a:prstGeom prst="ellipse">
+            <a:avLst/>
+          </a:prstGeom>
+        </p:spPr>
+        <p:style>
+          <a:lnRef idx="2">
+            <a:schemeClr val="accent1">
+              <a:shade val="50000"/>
+            </a:schemeClr>
+          </a:lnRef>
+          <a:fillRef idx="1">
+            <a:schemeClr val="accent1"/>
+          </a:fillRef>
+          <a:effectRef idx="0">
+            <a:schemeClr val="accent1"/>
+          </a:effectRef>
+          <a:fontRef idx="minor">
+            <a:schemeClr val="lt1"/>
+          </a:fontRef>
+        </p:style>
+        <p:txBody>
+          <a:bodyPr rtlCol="0" anchor="ctr"/>
+          <a:lstStyle/>
+          <a:p>
+            <a:pPr algn="ctr"/>
+            <a:r>
+              <a:rPr lang="fr-FR" sz="600" dirty="0" smtClean="0"/>
+              <a:t>EDF</a:t>
+            </a:r>
+            <a:endParaRPr lang="fr-FR" dirty="0"/>
           </a:p>
         </p:txBody>
       </p:sp>
@@ -7231,6 +7594,33 @@
                                   </p:childTnLst>
                                 </p:cTn>
                               </p:par>
+                              <p:par>
+                                <p:cTn id="7" presetID="1" presetClass="entr" presetSubtype="0" fill="hold" grpId="0" nodeType="withEffect">
+                                  <p:stCondLst>
+                                    <p:cond delay="0"/>
+                                  </p:stCondLst>
+                                  <p:childTnLst>
+                                    <p:set>
+                                      <p:cBhvr>
+                                        <p:cTn id="8" dur="1" fill="hold">
+                                          <p:stCondLst>
+                                            <p:cond delay="0"/>
+                                          </p:stCondLst>
+                                        </p:cTn>
+                                        <p:tgtEl>
+                                          <p:spTgt spid="14"/>
+                                        </p:tgtEl>
+                                        <p:attrNameLst>
+                                          <p:attrName>style.visibility</p:attrName>
+                                        </p:attrNameLst>
+                                      </p:cBhvr>
+                                      <p:to>
+                                        <p:strVal val="visible"/>
+                                      </p:to>
+                                    </p:set>
+                                  </p:childTnLst>
+                                </p:cTn>
+                              </p:par>
                             </p:childTnLst>
                           </p:cTn>
                         </p:par>
@@ -7258,6 +7648,9 @@
         </p:cTn>
       </p:par>
     </p:tnLst>
+    <p:bldLst>
+      <p:bldP spid="14" grpId="0" animBg="1"/>
+    </p:bldLst>
   </p:timing>
 </p:sld>
 </file>
@@ -8004,7 +8397,7 @@
         <a:font script="Uigh" typeface="Microsoft Uighur"/>
       </a:minorFont>
     </a:fontScheme>
-    <a:fmtScheme name="Technique">
+    <a:fmtScheme name="Urbain">
       <a:fillStyleLst>
         <a:solidFill>
           <a:schemeClr val="phClr"/>
@@ -8014,92 +8407,53 @@
             <a:gs pos="0">
               <a:schemeClr val="phClr">
                 <a:tint val="1000"/>
+                <a:satMod val="255000"/>
               </a:schemeClr>
             </a:gs>
-            <a:gs pos="68000">
+            <a:gs pos="55000">
               <a:schemeClr val="phClr">
-                <a:tint val="77000"/>
-              </a:schemeClr>
-            </a:gs>
-            <a:gs pos="81000">
-              <a:schemeClr val="phClr">
-                <a:tint val="79000"/>
-              </a:schemeClr>
-            </a:gs>
-            <a:gs pos="86000">
-              <a:schemeClr val="phClr">
-                <a:tint val="73000"/>
+                <a:tint val="12000"/>
+                <a:satMod val="255000"/>
               </a:schemeClr>
             </a:gs>
             <a:gs pos="100000">
               <a:schemeClr val="phClr">
-                <a:tint val="35000"/>
+                <a:tint val="45000"/>
+                <a:satMod val="250000"/>
               </a:schemeClr>
             </a:gs>
           </a:gsLst>
-          <a:lin ang="5400000" scaled="1"/>
+          <a:path path="circle">
+            <a:fillToRect l="-40000" t="-90000" r="140000" b="190000"/>
+          </a:path>
         </a:gradFill>
         <a:gradFill rotWithShape="1">
           <a:gsLst>
             <a:gs pos="0">
               <a:schemeClr val="phClr">
-                <a:tint val="73000"/>
-                <a:satMod val="150000"/>
-              </a:schemeClr>
-            </a:gs>
-            <a:gs pos="25000">
-              <a:schemeClr val="phClr">
-                <a:tint val="96000"/>
-                <a:shade val="80000"/>
-                <a:satMod val="105000"/>
-              </a:schemeClr>
-            </a:gs>
-            <a:gs pos="38000">
-              <a:schemeClr val="phClr">
-                <a:tint val="96000"/>
-                <a:shade val="59000"/>
-                <a:satMod val="120000"/>
+                <a:tint val="43000"/>
+                <a:satMod val="165000"/>
               </a:schemeClr>
             </a:gs>
             <a:gs pos="55000">
               <a:schemeClr val="phClr">
-                <a:shade val="57000"/>
-                <a:satMod val="120000"/>
-              </a:schemeClr>
-            </a:gs>
-            <a:gs pos="80000">
-              <a:schemeClr val="phClr">
-                <a:shade val="56000"/>
-                <a:satMod val="145000"/>
-              </a:schemeClr>
-            </a:gs>
-            <a:gs pos="88000">
-              <a:schemeClr val="phClr">
-                <a:shade val="63000"/>
-                <a:satMod val="160000"/>
+                <a:tint val="83000"/>
+                <a:satMod val="155000"/>
               </a:schemeClr>
             </a:gs>
             <a:gs pos="100000">
               <a:schemeClr val="phClr">
-                <a:tint val="99555"/>
-                <a:satMod val="155000"/>
+                <a:shade val="85000"/>
               </a:schemeClr>
             </a:gs>
           </a:gsLst>
-          <a:lin ang="5400000" scaled="1"/>
+          <a:path path="circle">
+            <a:fillToRect l="-40000" t="-90000" r="140000" b="190000"/>
+          </a:path>
         </a:gradFill>
       </a:fillStyleLst>
       <a:lnStyleLst>
         <a:ln w="9525" cap="flat" cmpd="sng" algn="ctr">
-          <a:solidFill>
-            <a:schemeClr val="phClr">
-              <a:shade val="60000"/>
-              <a:satMod val="300000"/>
-            </a:schemeClr>
-          </a:solidFill>
-          <a:prstDash val="solid"/>
-        </a:ln>
-        <a:ln w="19050" cap="flat" cmpd="sng" algn="ctr">
           <a:solidFill>
             <a:schemeClr val="phClr"/>
           </a:solidFill>
@@ -8111,57 +8465,53 @@
           </a:solidFill>
           <a:prstDash val="solid"/>
         </a:ln>
+        <a:ln w="31750" cap="flat" cmpd="sng" algn="ctr">
+          <a:solidFill>
+            <a:schemeClr val="phClr"/>
+          </a:solidFill>
+          <a:prstDash val="solid"/>
+        </a:ln>
       </a:lnStyleLst>
       <a:effectStyleLst>
         <a:effectStyle>
           <a:effectLst>
-            <a:glow rad="63500">
-              <a:schemeClr val="phClr">
-                <a:tint val="30000"/>
-                <a:shade val="95000"/>
-                <a:satMod val="300000"/>
-                <a:alpha val="50000"/>
-              </a:schemeClr>
-            </a:glow>
+            <a:outerShdw blurRad="51500" dist="25400" dir="5400000" rotWithShape="0">
+              <a:srgbClr val="000000">
+                <a:alpha val="40000"/>
+              </a:srgbClr>
+            </a:outerShdw>
           </a:effectLst>
         </a:effectStyle>
         <a:effectStyle>
           <a:effectLst>
-            <a:glow rad="70000">
-              <a:schemeClr val="phClr">
-                <a:tint val="30000"/>
-                <a:shade val="95000"/>
-                <a:satMod val="300000"/>
-                <a:alpha val="50000"/>
-              </a:schemeClr>
-            </a:glow>
+            <a:outerShdw blurRad="50800" dist="25400" dir="5400000" rotWithShape="0">
+              <a:srgbClr val="000000">
+                <a:alpha val="45000"/>
+              </a:srgbClr>
+            </a:outerShdw>
           </a:effectLst>
         </a:effectStyle>
         <a:effectStyle>
           <a:effectLst>
-            <a:glow rad="76200">
-              <a:schemeClr val="phClr">
-                <a:tint val="30000"/>
-                <a:shade val="95000"/>
-                <a:satMod val="300000"/>
-                <a:alpha val="50000"/>
-              </a:schemeClr>
-            </a:glow>
+            <a:outerShdw blurRad="50800" dist="25400" dir="5400000" rotWithShape="0">
+              <a:srgbClr val="000000">
+                <a:alpha val="45000"/>
+              </a:srgbClr>
+            </a:outerShdw>
           </a:effectLst>
           <a:scene3d>
             <a:camera prst="orthographicFront" fov="0">
               <a:rot lat="0" lon="0" rev="0"/>
             </a:camera>
-            <a:lightRig rig="harsh" dir="t">
-              <a:rot lat="6000000" lon="6000000" rev="0"/>
+            <a:lightRig rig="flat" dir="t">
+              <a:rot lat="0" lon="0" rev="20040000"/>
             </a:lightRig>
           </a:scene3d>
-          <a:sp3d contourW="10000" prstMaterial="metal">
-            <a:bevelT w="20000" h="9000" prst="softRound"/>
+          <a:sp3d contourW="12700" prstMaterial="dkEdge">
+            <a:bevelT w="25400" h="38100" prst="convex"/>
             <a:contourClr>
               <a:schemeClr val="phClr">
-                <a:shade val="30000"/>
-                <a:satMod val="200000"/>
+                <a:satMod val="115000"/>
               </a:schemeClr>
             </a:contourClr>
           </a:sp3d>

</xml_diff>

<commit_message>
MAJ 19/04/2018 Signed-off-by: DrBlaf <chauveau.aurelien.76@gmail.com>
</commit_message>
<xml_diff>
--- a/Rapport/Lore/presentation_revu2.pptx
+++ b/Rapport/Lore/presentation_revu2.pptx
@@ -204,7 +204,7 @@
             <a:fld id="{C96F4F48-8193-4084-9575-C48AE4CFB5A7}" type="datetimeFigureOut">
               <a:rPr lang="fr-FR" smtClean="0"/>
               <a:pPr/>
-              <a:t>17/04/2018</a:t>
+              <a:t>19/04/2018</a:t>
             </a:fld>
             <a:endParaRPr lang="fr-FR"/>
           </a:p>
@@ -937,7 +937,7 @@
             <a:fld id="{7385B5F2-299D-41E4-81B4-55AECBC730DC}" type="datetimeFigureOut">
               <a:rPr lang="fr-FR" smtClean="0"/>
               <a:pPr/>
-              <a:t>17/04/2018</a:t>
+              <a:t>19/04/2018</a:t>
             </a:fld>
             <a:endParaRPr lang="fr-FR"/>
           </a:p>
@@ -1104,7 +1104,7 @@
             <a:fld id="{7385B5F2-299D-41E4-81B4-55AECBC730DC}" type="datetimeFigureOut">
               <a:rPr lang="fr-FR" smtClean="0"/>
               <a:pPr/>
-              <a:t>17/04/2018</a:t>
+              <a:t>19/04/2018</a:t>
             </a:fld>
             <a:endParaRPr lang="fr-FR"/>
           </a:p>
@@ -1281,7 +1281,7 @@
             <a:fld id="{7385B5F2-299D-41E4-81B4-55AECBC730DC}" type="datetimeFigureOut">
               <a:rPr lang="fr-FR" smtClean="0"/>
               <a:pPr/>
-              <a:t>17/04/2018</a:t>
+              <a:t>19/04/2018</a:t>
             </a:fld>
             <a:endParaRPr lang="fr-FR"/>
           </a:p>
@@ -1452,7 +1452,7 @@
             <a:fld id="{7385B5F2-299D-41E4-81B4-55AECBC730DC}" type="datetimeFigureOut">
               <a:rPr lang="fr-FR" smtClean="0"/>
               <a:pPr/>
-              <a:t>17/04/2018</a:t>
+              <a:t>19/04/2018</a:t>
             </a:fld>
             <a:endParaRPr lang="fr-FR"/>
           </a:p>
@@ -1916,7 +1916,7 @@
             <a:fld id="{7385B5F2-299D-41E4-81B4-55AECBC730DC}" type="datetimeFigureOut">
               <a:rPr lang="fr-FR" smtClean="0"/>
               <a:pPr/>
-              <a:t>17/04/2018</a:t>
+              <a:t>19/04/2018</a:t>
             </a:fld>
             <a:endParaRPr lang="fr-FR"/>
           </a:p>
@@ -2182,7 +2182,7 @@
             <a:fld id="{7385B5F2-299D-41E4-81B4-55AECBC730DC}" type="datetimeFigureOut">
               <a:rPr lang="fr-FR" smtClean="0"/>
               <a:pPr/>
-              <a:t>17/04/2018</a:t>
+              <a:t>19/04/2018</a:t>
             </a:fld>
             <a:endParaRPr lang="fr-FR"/>
           </a:p>
@@ -2558,7 +2558,7 @@
             <a:fld id="{7385B5F2-299D-41E4-81B4-55AECBC730DC}" type="datetimeFigureOut">
               <a:rPr lang="fr-FR" smtClean="0"/>
               <a:pPr/>
-              <a:t>17/04/2018</a:t>
+              <a:t>19/04/2018</a:t>
             </a:fld>
             <a:endParaRPr lang="fr-FR"/>
           </a:p>
@@ -2682,7 +2682,7 @@
             <a:fld id="{7385B5F2-299D-41E4-81B4-55AECBC730DC}" type="datetimeFigureOut">
               <a:rPr lang="fr-FR" smtClean="0"/>
               <a:pPr/>
-              <a:t>17/04/2018</a:t>
+              <a:t>19/04/2018</a:t>
             </a:fld>
             <a:endParaRPr lang="fr-FR"/>
           </a:p>
@@ -2774,7 +2774,7 @@
             <a:fld id="{7385B5F2-299D-41E4-81B4-55AECBC730DC}" type="datetimeFigureOut">
               <a:rPr lang="fr-FR" smtClean="0"/>
               <a:pPr/>
-              <a:t>17/04/2018</a:t>
+              <a:t>19/04/2018</a:t>
             </a:fld>
             <a:endParaRPr lang="fr-FR"/>
           </a:p>
@@ -3025,7 +3025,7 @@
             <a:fld id="{7385B5F2-299D-41E4-81B4-55AECBC730DC}" type="datetimeFigureOut">
               <a:rPr lang="fr-FR" smtClean="0"/>
               <a:pPr/>
-              <a:t>17/04/2018</a:t>
+              <a:t>19/04/2018</a:t>
             </a:fld>
             <a:endParaRPr lang="fr-FR"/>
           </a:p>
@@ -3286,7 +3286,7 @@
             <a:fld id="{7385B5F2-299D-41E4-81B4-55AECBC730DC}" type="datetimeFigureOut">
               <a:rPr lang="fr-FR" smtClean="0"/>
               <a:pPr/>
-              <a:t>17/04/2018</a:t>
+              <a:t>19/04/2018</a:t>
             </a:fld>
             <a:endParaRPr lang="fr-FR"/>
           </a:p>
@@ -3692,7 +3692,7 @@
             <a:fld id="{7385B5F2-299D-41E4-81B4-55AECBC730DC}" type="datetimeFigureOut">
               <a:rPr lang="fr-FR" smtClean="0"/>
               <a:pPr/>
-              <a:t>17/04/2018</a:t>
+              <a:t>19/04/2018</a:t>
             </a:fld>
             <a:endParaRPr lang="fr-FR"/>
           </a:p>
@@ -4133,11 +4133,7 @@
           <a:p>
             <a:r>
               <a:rPr lang="fr-FR" dirty="0" smtClean="0"/>
-              <a:t>Revu de projet </a:t>
-            </a:r>
-            <a:r>
-              <a:rPr lang="fr-FR" dirty="0" smtClean="0"/>
-              <a:t>N°3</a:t>
+              <a:t>Revu de projet N°3</a:t>
             </a:r>
             <a:endParaRPr lang="fr-FR" dirty="0"/>
           </a:p>
@@ -4776,6 +4772,44 @@
           <a:chExt cx="0" cy="0"/>
         </a:xfrm>
       </p:grpSpPr>
+      <p:pic>
+        <p:nvPicPr>
+          <p:cNvPr id="14" name="Image 13" descr="regroupement.PNG"/>
+          <p:cNvPicPr>
+            <a:picLocks noChangeAspect="1"/>
+          </p:cNvPicPr>
+          <p:nvPr/>
+        </p:nvPicPr>
+        <p:blipFill>
+          <a:blip r:embed="rId2"/>
+          <a:stretch>
+            <a:fillRect/>
+          </a:stretch>
+        </p:blipFill>
+        <p:spPr>
+          <a:xfrm>
+            <a:off x="142844" y="1428740"/>
+            <a:ext cx="4612468" cy="4143404"/>
+          </a:xfrm>
+          <a:prstGeom prst="rect">
+            <a:avLst/>
+          </a:prstGeom>
+          <a:ln w="38100" cap="sq">
+            <a:solidFill>
+              <a:schemeClr val="accent1"/>
+            </a:solidFill>
+            <a:prstDash val="solid"/>
+            <a:miter lim="800000"/>
+          </a:ln>
+          <a:effectLst>
+            <a:outerShdw blurRad="50800" dist="38100" dir="2700000" algn="tl" rotWithShape="0">
+              <a:srgbClr val="000000">
+                <a:alpha val="43000"/>
+              </a:srgbClr>
+            </a:outerShdw>
+          </a:effectLst>
+        </p:spPr>
+      </p:pic>
       <p:sp>
         <p:nvSpPr>
           <p:cNvPr id="2" name="Titre 1"/>
@@ -4889,30 +4923,6 @@
               </a:rPr>
               <a:t>REGROUPEMENT FINAL DE CETTE PARTIE</a:t>
             </a:r>
-            <a:endParaRPr lang="fr-FR" b="1" spc="50" dirty="0" smtClean="0">
-              <a:ln w="13500">
-                <a:solidFill>
-                  <a:schemeClr val="accent1">
-                    <a:shade val="2500"/>
-                    <a:alpha val="6500"/>
-                  </a:schemeClr>
-                </a:solidFill>
-                <a:prstDash val="solid"/>
-              </a:ln>
-              <a:solidFill>
-                <a:schemeClr val="accent1">
-                  <a:tint val="3000"/>
-                  <a:alpha val="95000"/>
-                </a:schemeClr>
-              </a:solidFill>
-              <a:effectLst>
-                <a:innerShdw blurRad="50900" dist="38500" dir="13500000">
-                  <a:srgbClr val="000000">
-                    <a:alpha val="60000"/>
-                  </a:srgbClr>
-                </a:innerShdw>
-              </a:effectLst>
-            </a:endParaRPr>
           </a:p>
           <a:p>
             <a:endParaRPr lang="fr-FR" dirty="0"/>
@@ -4921,22 +4931,22 @@
       </p:sp>
       <p:pic>
         <p:nvPicPr>
-          <p:cNvPr id="10" name="Image 9" descr="regroupement.PNG"/>
+          <p:cNvPr id="11" name="Image 10" descr="timer.PNG"/>
           <p:cNvPicPr>
             <a:picLocks noChangeAspect="1"/>
           </p:cNvPicPr>
           <p:nvPr/>
         </p:nvPicPr>
         <p:blipFill>
-          <a:blip r:embed="rId2"/>
+          <a:blip r:embed="rId3"/>
           <a:stretch>
             <a:fillRect/>
           </a:stretch>
         </p:blipFill>
         <p:spPr>
           <a:xfrm>
-            <a:off x="71406" y="1428740"/>
-            <a:ext cx="4681188" cy="4205135"/>
+            <a:off x="5357818" y="2000244"/>
+            <a:ext cx="2648320" cy="666843"/>
           </a:xfrm>
           <a:prstGeom prst="rect">
             <a:avLst/>
@@ -4957,24 +4967,66 @@
           </a:effectLst>
         </p:spPr>
       </p:pic>
+      <p:sp>
+        <p:nvSpPr>
+          <p:cNvPr id="9" name="ZoneTexte 8"/>
+          <p:cNvSpPr txBox="1"/>
+          <p:nvPr/>
+        </p:nvSpPr>
+        <p:spPr>
+          <a:xfrm>
+            <a:off x="142844" y="1428740"/>
+            <a:ext cx="1357322" cy="646331"/>
+          </a:xfrm>
+          <a:prstGeom prst="rect">
+            <a:avLst/>
+          </a:prstGeom>
+          <a:noFill/>
+        </p:spPr>
+        <p:txBody>
+          <a:bodyPr wrap="square" rtlCol="0">
+            <a:spAutoFit/>
+          </a:bodyPr>
+          <a:lstStyle/>
+          <a:p>
+            <a:r>
+              <a:rPr lang="fr-FR" sz="1200" b="1" dirty="0" smtClean="0">
+                <a:solidFill>
+                  <a:schemeClr val="accent3"/>
+                </a:solidFill>
+                <a:latin typeface="Courier New" pitchFamily="49" charset="0"/>
+                <a:cs typeface="Courier New" pitchFamily="49" charset="0"/>
+              </a:rPr>
+              <a:t>Montage du regroupement final</a:t>
+            </a:r>
+            <a:endParaRPr lang="fr-FR" sz="1200" b="1" dirty="0">
+              <a:solidFill>
+                <a:schemeClr val="accent3"/>
+              </a:solidFill>
+              <a:latin typeface="Courier New" pitchFamily="49" charset="0"/>
+              <a:cs typeface="Courier New" pitchFamily="49" charset="0"/>
+            </a:endParaRPr>
+          </a:p>
+        </p:txBody>
+      </p:sp>
       <p:pic>
         <p:nvPicPr>
-          <p:cNvPr id="11" name="Image 10" descr="timer.PNG"/>
+          <p:cNvPr id="12" name="Image 11" descr="timer_2.PNG"/>
           <p:cNvPicPr>
             <a:picLocks noChangeAspect="1"/>
           </p:cNvPicPr>
           <p:nvPr/>
         </p:nvPicPr>
         <p:blipFill>
-          <a:blip r:embed="rId3"/>
+          <a:blip r:embed="rId4"/>
           <a:stretch>
             <a:fillRect/>
           </a:stretch>
         </p:blipFill>
         <p:spPr>
           <a:xfrm>
-            <a:off x="5357818" y="2000244"/>
-            <a:ext cx="2648320" cy="666843"/>
+            <a:off x="5715008" y="2857500"/>
+            <a:ext cx="1952898" cy="1514687"/>
           </a:xfrm>
           <a:prstGeom prst="rect">
             <a:avLst/>
@@ -4997,14 +5049,14 @@
       </p:pic>
       <p:sp>
         <p:nvSpPr>
-          <p:cNvPr id="9" name="ZoneTexte 8"/>
+          <p:cNvPr id="13" name="ZoneTexte 12"/>
           <p:cNvSpPr txBox="1"/>
           <p:nvPr/>
         </p:nvSpPr>
         <p:spPr>
           <a:xfrm>
-            <a:off x="71406" y="1428740"/>
-            <a:ext cx="1357322" cy="646331"/>
+            <a:off x="6215074" y="1643054"/>
+            <a:ext cx="1071570" cy="276999"/>
           </a:xfrm>
           <a:prstGeom prst="rect">
             <a:avLst/>
@@ -5025,107 +5077,7 @@
                 <a:latin typeface="Courier New" pitchFamily="49" charset="0"/>
                 <a:cs typeface="Courier New" pitchFamily="49" charset="0"/>
               </a:rPr>
-              <a:t>Montage du </a:t>
-            </a:r>
-            <a:r>
-              <a:rPr lang="fr-FR" sz="1200" b="1" dirty="0" smtClean="0">
-                <a:solidFill>
-                  <a:schemeClr val="accent3"/>
-                </a:solidFill>
-                <a:latin typeface="Courier New" pitchFamily="49" charset="0"/>
-                <a:cs typeface="Courier New" pitchFamily="49" charset="0"/>
-              </a:rPr>
-              <a:t>regroupement final</a:t>
-            </a:r>
-            <a:endParaRPr lang="fr-FR" sz="1200" b="1" dirty="0">
-              <a:solidFill>
-                <a:schemeClr val="accent3"/>
-              </a:solidFill>
-              <a:latin typeface="Courier New" pitchFamily="49" charset="0"/>
-              <a:cs typeface="Courier New" pitchFamily="49" charset="0"/>
-            </a:endParaRPr>
-          </a:p>
-        </p:txBody>
-      </p:sp>
-      <p:pic>
-        <p:nvPicPr>
-          <p:cNvPr id="12" name="Image 11" descr="timer_2.PNG"/>
-          <p:cNvPicPr>
-            <a:picLocks noChangeAspect="1"/>
-          </p:cNvPicPr>
-          <p:nvPr/>
-        </p:nvPicPr>
-        <p:blipFill>
-          <a:blip r:embed="rId4"/>
-          <a:stretch>
-            <a:fillRect/>
-          </a:stretch>
-        </p:blipFill>
-        <p:spPr>
-          <a:xfrm>
-            <a:off x="5715008" y="2857500"/>
-            <a:ext cx="1952898" cy="1514687"/>
-          </a:xfrm>
-          <a:prstGeom prst="rect">
-            <a:avLst/>
-          </a:prstGeom>
-          <a:ln w="38100" cap="sq">
-            <a:solidFill>
-              <a:schemeClr val="accent1"/>
-            </a:solidFill>
-            <a:prstDash val="solid"/>
-            <a:miter lim="800000"/>
-          </a:ln>
-          <a:effectLst>
-            <a:outerShdw blurRad="50800" dist="38100" dir="2700000" algn="tl" rotWithShape="0">
-              <a:srgbClr val="000000">
-                <a:alpha val="43000"/>
-              </a:srgbClr>
-            </a:outerShdw>
-          </a:effectLst>
-        </p:spPr>
-      </p:pic>
-      <p:sp>
-        <p:nvSpPr>
-          <p:cNvPr id="13" name="ZoneTexte 12"/>
-          <p:cNvSpPr txBox="1"/>
-          <p:nvPr/>
-        </p:nvSpPr>
-        <p:spPr>
-          <a:xfrm>
-            <a:off x="6215074" y="1643054"/>
-            <a:ext cx="1071570" cy="276999"/>
-          </a:xfrm>
-          <a:prstGeom prst="rect">
-            <a:avLst/>
-          </a:prstGeom>
-          <a:noFill/>
-        </p:spPr>
-        <p:txBody>
-          <a:bodyPr wrap="square" rtlCol="0">
-            <a:spAutoFit/>
-          </a:bodyPr>
-          <a:lstStyle/>
-          <a:p>
-            <a:r>
-              <a:rPr lang="fr-FR" sz="1200" b="1" dirty="0" smtClean="0">
-                <a:solidFill>
-                  <a:schemeClr val="accent3"/>
-                </a:solidFill>
-                <a:latin typeface="Courier New" pitchFamily="49" charset="0"/>
-                <a:cs typeface="Courier New" pitchFamily="49" charset="0"/>
-              </a:rPr>
-              <a:t>Le t</a:t>
-            </a:r>
-            <a:r>
-              <a:rPr lang="fr-FR" sz="1200" b="1" dirty="0" smtClean="0">
-                <a:solidFill>
-                  <a:schemeClr val="accent3"/>
-                </a:solidFill>
-                <a:latin typeface="Courier New" pitchFamily="49" charset="0"/>
-                <a:cs typeface="Courier New" pitchFamily="49" charset="0"/>
-              </a:rPr>
-              <a:t>imer</a:t>
+              <a:t>Le timer</a:t>
             </a:r>
             <a:endParaRPr lang="fr-FR" sz="1200" b="1" dirty="0">
               <a:solidFill>
@@ -7067,8 +7019,10 @@
       </p:grpSpPr>
       <p:pic>
         <p:nvPicPr>
-          <p:cNvPr id="11" name="Image 10" descr="Sema_radiateur_off.png"/>
-          <p:cNvPicPr/>
+          <p:cNvPr id="16" name="Image 15" descr="Sema_radiateur_on.png"/>
+          <p:cNvPicPr>
+            <a:picLocks noChangeAspect="1"/>
+          </p:cNvPicPr>
           <p:nvPr/>
         </p:nvPicPr>
         <p:blipFill>
@@ -7079,122 +7033,8 @@
         </p:blipFill>
         <p:spPr>
           <a:xfrm>
-            <a:off x="214282" y="1643054"/>
-            <a:ext cx="4857784" cy="3635347"/>
-          </a:xfrm>
-          <a:prstGeom prst="rect">
-            <a:avLst/>
-          </a:prstGeom>
-          <a:ln w="38100" cap="sq">
-            <a:solidFill>
-              <a:schemeClr val="accent1"/>
-            </a:solidFill>
-            <a:prstDash val="solid"/>
-            <a:miter lim="800000"/>
-          </a:ln>
-          <a:effectLst>
-            <a:outerShdw blurRad="50800" dist="38100" dir="2700000" algn="tl" rotWithShape="0">
-              <a:srgbClr val="000000">
-                <a:alpha val="43000"/>
-              </a:srgbClr>
-            </a:outerShdw>
-          </a:effectLst>
-        </p:spPr>
-      </p:pic>
-      <p:sp>
-        <p:nvSpPr>
-          <p:cNvPr id="15" name="Ellipse 14"/>
-          <p:cNvSpPr/>
-          <p:nvPr/>
-        </p:nvSpPr>
-        <p:spPr>
-          <a:xfrm>
-            <a:off x="4143372" y="3429004"/>
-            <a:ext cx="357190" cy="357190"/>
-          </a:xfrm>
-          <a:prstGeom prst="ellipse">
-            <a:avLst/>
-          </a:prstGeom>
-        </p:spPr>
-        <p:style>
-          <a:lnRef idx="2">
-            <a:schemeClr val="accent1">
-              <a:shade val="50000"/>
-            </a:schemeClr>
-          </a:lnRef>
-          <a:fillRef idx="1">
-            <a:schemeClr val="accent1"/>
-          </a:fillRef>
-          <a:effectRef idx="0">
-            <a:schemeClr val="accent1"/>
-          </a:effectRef>
-          <a:fontRef idx="minor">
-            <a:schemeClr val="lt1"/>
-          </a:fontRef>
-        </p:style>
-        <p:txBody>
-          <a:bodyPr rtlCol="0" anchor="ctr"/>
-          <a:lstStyle/>
-          <a:p>
-            <a:pPr algn="ctr"/>
-            <a:endParaRPr lang="fr-FR" dirty="0"/>
-          </a:p>
-        </p:txBody>
-      </p:sp>
-      <p:sp>
-        <p:nvSpPr>
-          <p:cNvPr id="9" name="ZoneTexte 8"/>
-          <p:cNvSpPr txBox="1"/>
-          <p:nvPr/>
-        </p:nvSpPr>
-        <p:spPr>
-          <a:xfrm>
-            <a:off x="1652477" y="2428872"/>
-            <a:ext cx="633507" cy="230832"/>
-          </a:xfrm>
-          <a:prstGeom prst="rect">
-            <a:avLst/>
-          </a:prstGeom>
-          <a:noFill/>
-        </p:spPr>
-        <p:txBody>
-          <a:bodyPr wrap="none" rtlCol="0">
-            <a:spAutoFit/>
-          </a:bodyPr>
-          <a:lstStyle/>
-          <a:p>
-            <a:r>
-              <a:rPr lang="fr-FR" sz="900" dirty="0" smtClean="0">
-                <a:solidFill>
-                  <a:srgbClr val="FF0000"/>
-                </a:solidFill>
-              </a:rPr>
-              <a:t>Montage</a:t>
-            </a:r>
-            <a:endParaRPr lang="fr-FR" dirty="0">
-              <a:solidFill>
-                <a:srgbClr val="FF0000"/>
-              </a:solidFill>
-            </a:endParaRPr>
-          </a:p>
-        </p:txBody>
-      </p:sp>
-      <p:pic>
-        <p:nvPicPr>
-          <p:cNvPr id="12" name="Image 11" descr="Sema_radiateur_on.png"/>
-          <p:cNvPicPr/>
-          <p:nvPr/>
-        </p:nvPicPr>
-        <p:blipFill>
-          <a:blip r:embed="rId3"/>
-          <a:stretch>
-            <a:fillRect/>
-          </a:stretch>
-        </p:blipFill>
-        <p:spPr>
-          <a:xfrm>
-            <a:off x="357158" y="1785930"/>
-            <a:ext cx="5259225" cy="3632529"/>
+            <a:off x="142844" y="2214558"/>
+            <a:ext cx="5394440" cy="3071834"/>
           </a:xfrm>
           <a:prstGeom prst="rect">
             <a:avLst/>
@@ -7390,7 +7230,7 @@
           <p:nvPr/>
         </p:nvPicPr>
         <p:blipFill>
-          <a:blip r:embed="rId4"/>
+          <a:blip r:embed="rId3"/>
           <a:stretch>
             <a:fillRect/>
           </a:stretch>
@@ -7426,7 +7266,7 @@
           <p:nvPr/>
         </p:nvPicPr>
         <p:blipFill>
-          <a:blip r:embed="rId5"/>
+          <a:blip r:embed="rId4"/>
           <a:srcRect/>
           <a:stretch>
             <a:fillRect/>
@@ -7500,45 +7340,43 @@
       </p:sp>
       <p:sp>
         <p:nvSpPr>
-          <p:cNvPr id="14" name="Ellipse 13"/>
-          <p:cNvSpPr/>
+          <p:cNvPr id="17" name="ZoneTexte 16"/>
+          <p:cNvSpPr txBox="1"/>
           <p:nvPr/>
         </p:nvSpPr>
         <p:spPr>
           <a:xfrm>
-            <a:off x="4286248" y="3500442"/>
-            <a:ext cx="571504" cy="571504"/>
-          </a:xfrm>
-          <a:prstGeom prst="ellipse">
+            <a:off x="214282" y="1857368"/>
+            <a:ext cx="2928958" cy="369332"/>
+          </a:xfrm>
+          <a:prstGeom prst="rect">
             <a:avLst/>
           </a:prstGeom>
-        </p:spPr>
-        <p:style>
-          <a:lnRef idx="2">
-            <a:schemeClr val="accent1">
-              <a:shade val="50000"/>
-            </a:schemeClr>
-          </a:lnRef>
-          <a:fillRef idx="1">
-            <a:schemeClr val="accent1"/>
-          </a:fillRef>
-          <a:effectRef idx="0">
-            <a:schemeClr val="accent1"/>
-          </a:effectRef>
-          <a:fontRef idx="minor">
-            <a:schemeClr val="lt1"/>
-          </a:fontRef>
-        </p:style>
-        <p:txBody>
-          <a:bodyPr rtlCol="0" anchor="ctr"/>
-          <a:lstStyle/>
-          <a:p>
-            <a:pPr algn="ctr"/>
-            <a:r>
-              <a:rPr lang="fr-FR" sz="600" dirty="0" smtClean="0"/>
-              <a:t>EDF</a:t>
-            </a:r>
-            <a:endParaRPr lang="fr-FR" dirty="0"/>
+          <a:noFill/>
+        </p:spPr>
+        <p:txBody>
+          <a:bodyPr wrap="square" rtlCol="0">
+            <a:spAutoFit/>
+          </a:bodyPr>
+          <a:lstStyle/>
+          <a:p>
+            <a:r>
+              <a:rPr lang="fr-FR" b="1" dirty="0" smtClean="0">
+                <a:solidFill>
+                  <a:schemeClr val="accent3"/>
+                </a:solidFill>
+                <a:latin typeface="Courier New" pitchFamily="49" charset="0"/>
+                <a:cs typeface="Courier New" pitchFamily="49" charset="0"/>
+              </a:rPr>
+              <a:t>Détails du relai</a:t>
+            </a:r>
+            <a:endParaRPr lang="fr-FR" b="1" dirty="0">
+              <a:solidFill>
+                <a:schemeClr val="accent3"/>
+              </a:solidFill>
+              <a:latin typeface="Courier New" pitchFamily="49" charset="0"/>
+              <a:cs typeface="Courier New" pitchFamily="49" charset="0"/>
+            </a:endParaRPr>
           </a:p>
         </p:txBody>
       </p:sp>
@@ -7550,107 +7388,9 @@
   <p:timing>
     <p:tnLst>
       <p:par>
-        <p:cTn id="1" dur="indefinite" restart="never" nodeType="tmRoot">
-          <p:childTnLst>
-            <p:seq concurrent="1" nextAc="seek">
-              <p:cTn id="2" dur="indefinite" nodeType="mainSeq">
-                <p:childTnLst>
-                  <p:par>
-                    <p:cTn id="3" fill="hold">
-                      <p:stCondLst>
-                        <p:cond delay="indefinite"/>
-                      </p:stCondLst>
-                      <p:childTnLst>
-                        <p:par>
-                          <p:cTn id="4" fill="hold">
-                            <p:stCondLst>
-                              <p:cond delay="0"/>
-                            </p:stCondLst>
-                            <p:childTnLst>
-                              <p:par>
-                                <p:cTn id="5" presetID="1" presetClass="entr" presetSubtype="0" fill="hold" nodeType="clickEffect">
-                                  <p:stCondLst>
-                                    <p:cond delay="0"/>
-                                  </p:stCondLst>
-                                  <p:childTnLst>
-                                    <p:set>
-                                      <p:cBhvr>
-                                        <p:cTn id="6" dur="1" fill="hold">
-                                          <p:stCondLst>
-                                            <p:cond delay="0"/>
-                                          </p:stCondLst>
-                                        </p:cTn>
-                                        <p:tgtEl>
-                                          <p:spTgt spid="12"/>
-                                        </p:tgtEl>
-                                        <p:attrNameLst>
-                                          <p:attrName>style.visibility</p:attrName>
-                                        </p:attrNameLst>
-                                      </p:cBhvr>
-                                      <p:to>
-                                        <p:strVal val="visible"/>
-                                      </p:to>
-                                    </p:set>
-                                  </p:childTnLst>
-                                </p:cTn>
-                              </p:par>
-                              <p:par>
-                                <p:cTn id="7" presetID="1" presetClass="entr" presetSubtype="0" fill="hold" grpId="0" nodeType="withEffect">
-                                  <p:stCondLst>
-                                    <p:cond delay="0"/>
-                                  </p:stCondLst>
-                                  <p:childTnLst>
-                                    <p:set>
-                                      <p:cBhvr>
-                                        <p:cTn id="8" dur="1" fill="hold">
-                                          <p:stCondLst>
-                                            <p:cond delay="0"/>
-                                          </p:stCondLst>
-                                        </p:cTn>
-                                        <p:tgtEl>
-                                          <p:spTgt spid="14"/>
-                                        </p:tgtEl>
-                                        <p:attrNameLst>
-                                          <p:attrName>style.visibility</p:attrName>
-                                        </p:attrNameLst>
-                                      </p:cBhvr>
-                                      <p:to>
-                                        <p:strVal val="visible"/>
-                                      </p:to>
-                                    </p:set>
-                                  </p:childTnLst>
-                                </p:cTn>
-                              </p:par>
-                            </p:childTnLst>
-                          </p:cTn>
-                        </p:par>
-                      </p:childTnLst>
-                    </p:cTn>
-                  </p:par>
-                </p:childTnLst>
-              </p:cTn>
-              <p:prevCondLst>
-                <p:cond evt="onPrev" delay="0">
-                  <p:tgtEl>
-                    <p:sldTgt/>
-                  </p:tgtEl>
-                </p:cond>
-              </p:prevCondLst>
-              <p:nextCondLst>
-                <p:cond evt="onNext" delay="0">
-                  <p:tgtEl>
-                    <p:sldTgt/>
-                  </p:tgtEl>
-                </p:cond>
-              </p:nextCondLst>
-            </p:seq>
-          </p:childTnLst>
-        </p:cTn>
+        <p:cTn id="1" dur="indefinite" restart="never" nodeType="tmRoot"/>
       </p:par>
     </p:tnLst>
-    <p:bldLst>
-      <p:bldP spid="14" grpId="0" animBg="1"/>
-    </p:bldLst>
   </p:timing>
 </p:sld>
 </file>

</xml_diff>

<commit_message>
MAJ 23/04/2018 Signed-off-by: DrBlaf <chauveau.aurelien.76@gmail.com>
</commit_message>
<xml_diff>
--- a/Rapport/Lore/presentation_revu2.pptx
+++ b/Rapport/Lore/presentation_revu2.pptx
@@ -204,7 +204,7 @@
             <a:fld id="{C96F4F48-8193-4084-9575-C48AE4CFB5A7}" type="datetimeFigureOut">
               <a:rPr lang="fr-FR" smtClean="0"/>
               <a:pPr/>
-              <a:t>19/04/2018</a:t>
+              <a:t>23/04/2018</a:t>
             </a:fld>
             <a:endParaRPr lang="fr-FR"/>
           </a:p>
@@ -937,7 +937,7 @@
             <a:fld id="{7385B5F2-299D-41E4-81B4-55AECBC730DC}" type="datetimeFigureOut">
               <a:rPr lang="fr-FR" smtClean="0"/>
               <a:pPr/>
-              <a:t>19/04/2018</a:t>
+              <a:t>23/04/2018</a:t>
             </a:fld>
             <a:endParaRPr lang="fr-FR"/>
           </a:p>
@@ -1104,7 +1104,7 @@
             <a:fld id="{7385B5F2-299D-41E4-81B4-55AECBC730DC}" type="datetimeFigureOut">
               <a:rPr lang="fr-FR" smtClean="0"/>
               <a:pPr/>
-              <a:t>19/04/2018</a:t>
+              <a:t>23/04/2018</a:t>
             </a:fld>
             <a:endParaRPr lang="fr-FR"/>
           </a:p>
@@ -1281,7 +1281,7 @@
             <a:fld id="{7385B5F2-299D-41E4-81B4-55AECBC730DC}" type="datetimeFigureOut">
               <a:rPr lang="fr-FR" smtClean="0"/>
               <a:pPr/>
-              <a:t>19/04/2018</a:t>
+              <a:t>23/04/2018</a:t>
             </a:fld>
             <a:endParaRPr lang="fr-FR"/>
           </a:p>
@@ -1452,7 +1452,7 @@
             <a:fld id="{7385B5F2-299D-41E4-81B4-55AECBC730DC}" type="datetimeFigureOut">
               <a:rPr lang="fr-FR" smtClean="0"/>
               <a:pPr/>
-              <a:t>19/04/2018</a:t>
+              <a:t>23/04/2018</a:t>
             </a:fld>
             <a:endParaRPr lang="fr-FR"/>
           </a:p>
@@ -1916,7 +1916,7 @@
             <a:fld id="{7385B5F2-299D-41E4-81B4-55AECBC730DC}" type="datetimeFigureOut">
               <a:rPr lang="fr-FR" smtClean="0"/>
               <a:pPr/>
-              <a:t>19/04/2018</a:t>
+              <a:t>23/04/2018</a:t>
             </a:fld>
             <a:endParaRPr lang="fr-FR"/>
           </a:p>
@@ -2182,7 +2182,7 @@
             <a:fld id="{7385B5F2-299D-41E4-81B4-55AECBC730DC}" type="datetimeFigureOut">
               <a:rPr lang="fr-FR" smtClean="0"/>
               <a:pPr/>
-              <a:t>19/04/2018</a:t>
+              <a:t>23/04/2018</a:t>
             </a:fld>
             <a:endParaRPr lang="fr-FR"/>
           </a:p>
@@ -2558,7 +2558,7 @@
             <a:fld id="{7385B5F2-299D-41E4-81B4-55AECBC730DC}" type="datetimeFigureOut">
               <a:rPr lang="fr-FR" smtClean="0"/>
               <a:pPr/>
-              <a:t>19/04/2018</a:t>
+              <a:t>23/04/2018</a:t>
             </a:fld>
             <a:endParaRPr lang="fr-FR"/>
           </a:p>
@@ -2682,7 +2682,7 @@
             <a:fld id="{7385B5F2-299D-41E4-81B4-55AECBC730DC}" type="datetimeFigureOut">
               <a:rPr lang="fr-FR" smtClean="0"/>
               <a:pPr/>
-              <a:t>19/04/2018</a:t>
+              <a:t>23/04/2018</a:t>
             </a:fld>
             <a:endParaRPr lang="fr-FR"/>
           </a:p>
@@ -2774,7 +2774,7 @@
             <a:fld id="{7385B5F2-299D-41E4-81B4-55AECBC730DC}" type="datetimeFigureOut">
               <a:rPr lang="fr-FR" smtClean="0"/>
               <a:pPr/>
-              <a:t>19/04/2018</a:t>
+              <a:t>23/04/2018</a:t>
             </a:fld>
             <a:endParaRPr lang="fr-FR"/>
           </a:p>
@@ -3025,7 +3025,7 @@
             <a:fld id="{7385B5F2-299D-41E4-81B4-55AECBC730DC}" type="datetimeFigureOut">
               <a:rPr lang="fr-FR" smtClean="0"/>
               <a:pPr/>
-              <a:t>19/04/2018</a:t>
+              <a:t>23/04/2018</a:t>
             </a:fld>
             <a:endParaRPr lang="fr-FR"/>
           </a:p>
@@ -3286,7 +3286,7 @@
             <a:fld id="{7385B5F2-299D-41E4-81B4-55AECBC730DC}" type="datetimeFigureOut">
               <a:rPr lang="fr-FR" smtClean="0"/>
               <a:pPr/>
-              <a:t>19/04/2018</a:t>
+              <a:t>23/04/2018</a:t>
             </a:fld>
             <a:endParaRPr lang="fr-FR"/>
           </a:p>
@@ -3692,7 +3692,7 @@
             <a:fld id="{7385B5F2-299D-41E4-81B4-55AECBC730DC}" type="datetimeFigureOut">
               <a:rPr lang="fr-FR" smtClean="0"/>
               <a:pPr/>
-              <a:t>19/04/2018</a:t>
+              <a:t>23/04/2018</a:t>
             </a:fld>
             <a:endParaRPr lang="fr-FR"/>
           </a:p>
@@ -5009,9 +5009,51 @@
           </a:p>
         </p:txBody>
       </p:sp>
+      <p:sp>
+        <p:nvSpPr>
+          <p:cNvPr id="13" name="ZoneTexte 12"/>
+          <p:cNvSpPr txBox="1"/>
+          <p:nvPr/>
+        </p:nvSpPr>
+        <p:spPr>
+          <a:xfrm>
+            <a:off x="6215074" y="1643054"/>
+            <a:ext cx="1071570" cy="276999"/>
+          </a:xfrm>
+          <a:prstGeom prst="rect">
+            <a:avLst/>
+          </a:prstGeom>
+          <a:noFill/>
+        </p:spPr>
+        <p:txBody>
+          <a:bodyPr wrap="square" rtlCol="0">
+            <a:spAutoFit/>
+          </a:bodyPr>
+          <a:lstStyle/>
+          <a:p>
+            <a:r>
+              <a:rPr lang="fr-FR" sz="1200" b="1" dirty="0" smtClean="0">
+                <a:solidFill>
+                  <a:schemeClr val="accent3"/>
+                </a:solidFill>
+                <a:latin typeface="Courier New" pitchFamily="49" charset="0"/>
+                <a:cs typeface="Courier New" pitchFamily="49" charset="0"/>
+              </a:rPr>
+              <a:t>Le timer</a:t>
+            </a:r>
+            <a:endParaRPr lang="fr-FR" sz="1200" b="1" dirty="0">
+              <a:solidFill>
+                <a:schemeClr val="accent3"/>
+              </a:solidFill>
+              <a:latin typeface="Courier New" pitchFamily="49" charset="0"/>
+              <a:cs typeface="Courier New" pitchFamily="49" charset="0"/>
+            </a:endParaRPr>
+          </a:p>
+        </p:txBody>
+      </p:sp>
       <p:pic>
         <p:nvPicPr>
-          <p:cNvPr id="12" name="Image 11" descr="timer_2.PNG"/>
+          <p:cNvPr id="10" name="Image 9" descr="timer_2.PNG"/>
           <p:cNvPicPr>
             <a:picLocks noChangeAspect="1"/>
           </p:cNvPicPr>
@@ -5025,8 +5067,8 @@
         </p:blipFill>
         <p:spPr>
           <a:xfrm>
-            <a:off x="5715008" y="2857500"/>
-            <a:ext cx="1952898" cy="1514687"/>
+            <a:off x="5786446" y="3000376"/>
+            <a:ext cx="1895740" cy="1638529"/>
           </a:xfrm>
           <a:prstGeom prst="rect">
             <a:avLst/>
@@ -5047,48 +5089,6 @@
           </a:effectLst>
         </p:spPr>
       </p:pic>
-      <p:sp>
-        <p:nvSpPr>
-          <p:cNvPr id="13" name="ZoneTexte 12"/>
-          <p:cNvSpPr txBox="1"/>
-          <p:nvPr/>
-        </p:nvSpPr>
-        <p:spPr>
-          <a:xfrm>
-            <a:off x="6215074" y="1643054"/>
-            <a:ext cx="1071570" cy="276999"/>
-          </a:xfrm>
-          <a:prstGeom prst="rect">
-            <a:avLst/>
-          </a:prstGeom>
-          <a:noFill/>
-        </p:spPr>
-        <p:txBody>
-          <a:bodyPr wrap="square" rtlCol="0">
-            <a:spAutoFit/>
-          </a:bodyPr>
-          <a:lstStyle/>
-          <a:p>
-            <a:r>
-              <a:rPr lang="fr-FR" sz="1200" b="1" dirty="0" smtClean="0">
-                <a:solidFill>
-                  <a:schemeClr val="accent3"/>
-                </a:solidFill>
-                <a:latin typeface="Courier New" pitchFamily="49" charset="0"/>
-                <a:cs typeface="Courier New" pitchFamily="49" charset="0"/>
-              </a:rPr>
-              <a:t>Le timer</a:t>
-            </a:r>
-            <a:endParaRPr lang="fr-FR" sz="1200" b="1" dirty="0">
-              <a:solidFill>
-                <a:schemeClr val="accent3"/>
-              </a:solidFill>
-              <a:latin typeface="Courier New" pitchFamily="49" charset="0"/>
-              <a:cs typeface="Courier New" pitchFamily="49" charset="0"/>
-            </a:endParaRPr>
-          </a:p>
-        </p:txBody>
-      </p:sp>
     </p:spTree>
   </p:cSld>
   <p:clrMapOvr>

</xml_diff>